<commit_message>
C. König: further slight modifications to the tool-chain chapter
</commit_message>
<xml_diff>
--- a/figures/fig_toolchain.pptx
+++ b/figures/fig_toolchain.pptx
@@ -288,7 +288,7 @@
           <a:p>
             <a:fld id="{DAF8F945-D4E8-487E-8A31-C092BBF66AEA}" type="datetimeFigureOut">
               <a:rPr lang="de-DE" smtClean="0"/>
-              <a:t>14.05.2018</a:t>
+              <a:t>21.08.2018</a:t>
             </a:fld>
             <a:endParaRPr lang="de-DE"/>
           </a:p>
@@ -458,7 +458,7 @@
           <a:p>
             <a:fld id="{DAF8F945-D4E8-487E-8A31-C092BBF66AEA}" type="datetimeFigureOut">
               <a:rPr lang="de-DE" smtClean="0"/>
-              <a:t>14.05.2018</a:t>
+              <a:t>21.08.2018</a:t>
             </a:fld>
             <a:endParaRPr lang="de-DE"/>
           </a:p>
@@ -638,7 +638,7 @@
           <a:p>
             <a:fld id="{DAF8F945-D4E8-487E-8A31-C092BBF66AEA}" type="datetimeFigureOut">
               <a:rPr lang="de-DE" smtClean="0"/>
-              <a:t>14.05.2018</a:t>
+              <a:t>21.08.2018</a:t>
             </a:fld>
             <a:endParaRPr lang="de-DE"/>
           </a:p>
@@ -808,7 +808,7 @@
           <a:p>
             <a:fld id="{DAF8F945-D4E8-487E-8A31-C092BBF66AEA}" type="datetimeFigureOut">
               <a:rPr lang="de-DE" smtClean="0"/>
-              <a:t>14.05.2018</a:t>
+              <a:t>21.08.2018</a:t>
             </a:fld>
             <a:endParaRPr lang="de-DE"/>
           </a:p>
@@ -1054,7 +1054,7 @@
           <a:p>
             <a:fld id="{DAF8F945-D4E8-487E-8A31-C092BBF66AEA}" type="datetimeFigureOut">
               <a:rPr lang="de-DE" smtClean="0"/>
-              <a:t>14.05.2018</a:t>
+              <a:t>21.08.2018</a:t>
             </a:fld>
             <a:endParaRPr lang="de-DE"/>
           </a:p>
@@ -1342,7 +1342,7 @@
           <a:p>
             <a:fld id="{DAF8F945-D4E8-487E-8A31-C092BBF66AEA}" type="datetimeFigureOut">
               <a:rPr lang="de-DE" smtClean="0"/>
-              <a:t>14.05.2018</a:t>
+              <a:t>21.08.2018</a:t>
             </a:fld>
             <a:endParaRPr lang="de-DE"/>
           </a:p>
@@ -1764,7 +1764,7 @@
           <a:p>
             <a:fld id="{DAF8F945-D4E8-487E-8A31-C092BBF66AEA}" type="datetimeFigureOut">
               <a:rPr lang="de-DE" smtClean="0"/>
-              <a:t>14.05.2018</a:t>
+              <a:t>21.08.2018</a:t>
             </a:fld>
             <a:endParaRPr lang="de-DE"/>
           </a:p>
@@ -1882,7 +1882,7 @@
           <a:p>
             <a:fld id="{DAF8F945-D4E8-487E-8A31-C092BBF66AEA}" type="datetimeFigureOut">
               <a:rPr lang="de-DE" smtClean="0"/>
-              <a:t>14.05.2018</a:t>
+              <a:t>21.08.2018</a:t>
             </a:fld>
             <a:endParaRPr lang="de-DE"/>
           </a:p>
@@ -1977,7 +1977,7 @@
           <a:p>
             <a:fld id="{DAF8F945-D4E8-487E-8A31-C092BBF66AEA}" type="datetimeFigureOut">
               <a:rPr lang="de-DE" smtClean="0"/>
-              <a:t>14.05.2018</a:t>
+              <a:t>21.08.2018</a:t>
             </a:fld>
             <a:endParaRPr lang="de-DE"/>
           </a:p>
@@ -2254,7 +2254,7 @@
           <a:p>
             <a:fld id="{DAF8F945-D4E8-487E-8A31-C092BBF66AEA}" type="datetimeFigureOut">
               <a:rPr lang="de-DE" smtClean="0"/>
-              <a:t>14.05.2018</a:t>
+              <a:t>21.08.2018</a:t>
             </a:fld>
             <a:endParaRPr lang="de-DE"/>
           </a:p>
@@ -2507,7 +2507,7 @@
           <a:p>
             <a:fld id="{DAF8F945-D4E8-487E-8A31-C092BBF66AEA}" type="datetimeFigureOut">
               <a:rPr lang="de-DE" smtClean="0"/>
-              <a:t>14.05.2018</a:t>
+              <a:t>21.08.2018</a:t>
             </a:fld>
             <a:endParaRPr lang="de-DE"/>
           </a:p>
@@ -2720,7 +2720,7 @@
           <a:p>
             <a:fld id="{DAF8F945-D4E8-487E-8A31-C092BBF66AEA}" type="datetimeFigureOut">
               <a:rPr lang="de-DE" smtClean="0"/>
-              <a:t>14.05.2018</a:t>
+              <a:t>21.08.2018</a:t>
             </a:fld>
             <a:endParaRPr lang="de-DE"/>
           </a:p>
@@ -3598,8 +3598,8 @@
         </p:nvSpPr>
         <p:spPr>
           <a:xfrm>
-            <a:off x="179512" y="2285256"/>
-            <a:ext cx="2520280" cy="3384376"/>
+            <a:off x="229332" y="2595080"/>
+            <a:ext cx="2470460" cy="3074551"/>
           </a:xfrm>
           <a:prstGeom prst="roundRect">
             <a:avLst>
@@ -3663,7 +3663,7 @@
         </p:blipFill>
         <p:spPr>
           <a:xfrm>
-            <a:off x="899592" y="2357264"/>
+            <a:off x="899592" y="2658398"/>
             <a:ext cx="1026148" cy="732318"/>
           </a:xfrm>
           <a:prstGeom prst="rect">
@@ -3969,7 +3969,7 @@
         </p:nvSpPr>
         <p:spPr>
           <a:xfrm>
-            <a:off x="823562" y="3005336"/>
+            <a:off x="823562" y="3306470"/>
             <a:ext cx="1156150" cy="338554"/>
           </a:xfrm>
           <a:prstGeom prst="rect">
@@ -4601,7 +4601,7 @@
         </p:blipFill>
         <p:spPr bwMode="auto">
           <a:xfrm>
-            <a:off x="9084603" y="476672"/>
+            <a:off x="8964488" y="682823"/>
             <a:ext cx="588167" cy="476250"/>
           </a:xfrm>
           <a:prstGeom prst="rect">
@@ -4624,7 +4624,7 @@
         </p:nvSpPr>
         <p:spPr>
           <a:xfrm>
-            <a:off x="8940587" y="898848"/>
+            <a:off x="8820472" y="1104999"/>
             <a:ext cx="887997" cy="307777"/>
           </a:xfrm>
           <a:prstGeom prst="rect">
@@ -4661,8 +4661,8 @@
         </p:nvCxnSpPr>
         <p:spPr>
           <a:xfrm>
-            <a:off x="9324528" y="1293961"/>
-            <a:ext cx="0" cy="2423071"/>
+            <a:off x="9324528" y="1473130"/>
+            <a:ext cx="0" cy="2243902"/>
           </a:xfrm>
           <a:prstGeom prst="straightConnector1">
             <a:avLst/>
@@ -4703,8 +4703,8 @@
         </p:nvCxnSpPr>
         <p:spPr>
           <a:xfrm rot="16200000" flipH="1">
-            <a:off x="2193640" y="4915644"/>
-            <a:ext cx="472244" cy="1980220"/>
+            <a:off x="2206095" y="4928098"/>
+            <a:ext cx="472245" cy="1955310"/>
           </a:xfrm>
           <a:prstGeom prst="bentConnector2">
             <a:avLst/>
@@ -5105,42 +5105,6 @@
                 </a:solidFill>
               </a:rPr>
               <a:t>co-simulate</a:t>
-            </a:r>
-          </a:p>
-        </p:txBody>
-      </p:sp>
-      <p:sp>
-        <p:nvSpPr>
-          <p:cNvPr id="64" name="TextBox 163"/>
-          <p:cNvSpPr txBox="1"/>
-          <p:nvPr/>
-        </p:nvSpPr>
-        <p:spPr>
-          <a:xfrm>
-            <a:off x="8839052" y="3194692"/>
-            <a:ext cx="447558" cy="215444"/>
-          </a:xfrm>
-          <a:prstGeom prst="rect">
-            <a:avLst/>
-          </a:prstGeom>
-          <a:noFill/>
-        </p:spPr>
-        <p:txBody>
-          <a:bodyPr wrap="none" rtlCol="0">
-            <a:spAutoFit/>
-          </a:bodyPr>
-          <a:lstStyle/>
-          <a:p>
-            <a:r>
-              <a:rPr lang="en-GB" sz="800" b="1" dirty="0">
-                <a:solidFill>
-                  <a:schemeClr val="tx1">
-                    <a:lumMod val="65000"/>
-                    <a:lumOff val="35000"/>
-                  </a:schemeClr>
-                </a:solidFill>
-              </a:rPr>
-              <a:t>oracle</a:t>
             </a:r>
           </a:p>
         </p:txBody>
@@ -5704,8 +5668,8 @@
         </p:nvSpPr>
         <p:spPr>
           <a:xfrm>
-            <a:off x="539553" y="836713"/>
-            <a:ext cx="2484276" cy="1151548"/>
+            <a:off x="179512" y="683404"/>
+            <a:ext cx="2844317" cy="1304857"/>
           </a:xfrm>
           <a:prstGeom prst="rect">
             <a:avLst/>
@@ -5751,7 +5715,7 @@
         </p:nvSpPr>
         <p:spPr>
           <a:xfrm>
-            <a:off x="572306" y="836712"/>
+            <a:off x="229332" y="768043"/>
             <a:ext cx="829331" cy="261610"/>
           </a:xfrm>
           <a:prstGeom prst="rect">
@@ -5782,12 +5746,20 @@
               <a:t> </a:t>
             </a:r>
             <a:r>
-              <a:rPr lang="de-DE" sz="1100" dirty="0" err="1" smtClean="0">
+              <a:rPr lang="de-DE" sz="1100" dirty="0" smtClean="0">
                 <a:solidFill>
                   <a:srgbClr val="FF0000"/>
                 </a:solidFill>
               </a:rPr>
-              <a:t>x.x</a:t>
+              <a:t>6</a:t>
+            </a:r>
+            <a:r>
+              <a:rPr lang="de-DE" sz="1100" dirty="0" smtClean="0">
+                <a:solidFill>
+                  <a:srgbClr val="FF0000"/>
+                </a:solidFill>
+              </a:rPr>
+              <a:t>.1</a:t>
             </a:r>
             <a:endParaRPr lang="de-DE" sz="1100" dirty="0">
               <a:solidFill>
@@ -6181,12 +6153,20 @@
               <a:t> </a:t>
             </a:r>
             <a:r>
-              <a:rPr lang="de-DE" sz="1100" dirty="0" err="1" smtClean="0">
+              <a:rPr lang="de-DE" sz="1100" dirty="0" smtClean="0">
                 <a:solidFill>
                   <a:srgbClr val="FF0000"/>
                 </a:solidFill>
               </a:rPr>
-              <a:t>x.x</a:t>
+              <a:t>6</a:t>
+            </a:r>
+            <a:r>
+              <a:rPr lang="de-DE" sz="1100" dirty="0" smtClean="0">
+                <a:solidFill>
+                  <a:srgbClr val="FF0000"/>
+                </a:solidFill>
+              </a:rPr>
+              <a:t>.2</a:t>
             </a:r>
             <a:endParaRPr lang="de-DE" sz="1100" dirty="0">
               <a:solidFill>
@@ -6292,7 +6272,7 @@
         </p:blipFill>
         <p:spPr bwMode="auto">
           <a:xfrm>
-            <a:off x="9324528" y="2038321"/>
+            <a:off x="8055953" y="2505496"/>
             <a:ext cx="1006878" cy="403465"/>
           </a:xfrm>
           <a:prstGeom prst="rect">
@@ -6325,128 +6305,6 @@
       </p:pic>
       <p:sp>
         <p:nvSpPr>
-          <p:cNvPr id="135" name="Textfeld 134"/>
-          <p:cNvSpPr txBox="1"/>
-          <p:nvPr/>
-        </p:nvSpPr>
-        <p:spPr>
-          <a:xfrm>
-            <a:off x="2168234" y="-264417"/>
-            <a:ext cx="1656184" cy="1200329"/>
-          </a:xfrm>
-          <a:prstGeom prst="rect">
-            <a:avLst/>
-          </a:prstGeom>
-          <a:noFill/>
-        </p:spPr>
-        <p:txBody>
-          <a:bodyPr wrap="square" rtlCol="0">
-            <a:spAutoFit/>
-          </a:bodyPr>
-          <a:lstStyle/>
-          <a:p>
-            <a:r>
-              <a:rPr lang="de-DE" dirty="0" smtClean="0"/>
-              <a:t>Human Computer Interaction? (</a:t>
-            </a:r>
-            <a:r>
-              <a:rPr lang="de-DE" dirty="0" err="1" smtClean="0"/>
-              <a:t>USibiu</a:t>
-            </a:r>
-            <a:r>
-              <a:rPr lang="de-DE" dirty="0" smtClean="0"/>
-              <a:t>)</a:t>
-            </a:r>
-            <a:endParaRPr lang="de-DE" dirty="0"/>
-          </a:p>
-        </p:txBody>
-      </p:sp>
-      <p:sp>
-        <p:nvSpPr>
-          <p:cNvPr id="136" name="Textfeld 135"/>
-          <p:cNvSpPr txBox="1"/>
-          <p:nvPr/>
-        </p:nvSpPr>
-        <p:spPr>
-          <a:xfrm>
-            <a:off x="7704348" y="2089666"/>
-            <a:ext cx="1656184" cy="923330"/>
-          </a:xfrm>
-          <a:prstGeom prst="rect">
-            <a:avLst/>
-          </a:prstGeom>
-          <a:noFill/>
-        </p:spPr>
-        <p:txBody>
-          <a:bodyPr wrap="square" rtlCol="0">
-            <a:spAutoFit/>
-          </a:bodyPr>
-          <a:lstStyle/>
-          <a:p>
-            <a:r>
-              <a:rPr lang="de-DE" dirty="0" smtClean="0"/>
-              <a:t>ABS Simulator </a:t>
-            </a:r>
-            <a:r>
-              <a:rPr lang="de-DE" dirty="0" err="1" smtClean="0"/>
-              <a:t>toolchain</a:t>
-            </a:r>
-            <a:r>
-              <a:rPr lang="de-DE" dirty="0" smtClean="0"/>
-              <a:t>? (</a:t>
-            </a:r>
-            <a:r>
-              <a:rPr lang="de-DE" dirty="0" err="1" smtClean="0"/>
-              <a:t>UOslo</a:t>
-            </a:r>
-            <a:r>
-              <a:rPr lang="de-DE" dirty="0" smtClean="0"/>
-              <a:t>)</a:t>
-            </a:r>
-            <a:endParaRPr lang="de-DE" dirty="0"/>
-          </a:p>
-        </p:txBody>
-      </p:sp>
-      <p:sp>
-        <p:nvSpPr>
-          <p:cNvPr id="137" name="Textfeld 136"/>
-          <p:cNvSpPr txBox="1"/>
-          <p:nvPr/>
-        </p:nvSpPr>
-        <p:spPr>
-          <a:xfrm>
-            <a:off x="5328084" y="-264417"/>
-            <a:ext cx="1656184" cy="923330"/>
-          </a:xfrm>
-          <a:prstGeom prst="rect">
-            <a:avLst/>
-          </a:prstGeom>
-          <a:noFill/>
-        </p:spPr>
-        <p:txBody>
-          <a:bodyPr wrap="square" rtlCol="0">
-            <a:spAutoFit/>
-          </a:bodyPr>
-          <a:lstStyle/>
-          <a:p>
-            <a:r>
-              <a:rPr lang="de-DE" dirty="0" smtClean="0"/>
-              <a:t>COSSIM Simulator? (</a:t>
-            </a:r>
-            <a:r>
-              <a:rPr lang="de-DE" dirty="0" err="1" smtClean="0"/>
-              <a:t>Synelexis</a:t>
-            </a:r>
-            <a:r>
-              <a:rPr lang="de-DE" dirty="0" smtClean="0"/>
-              <a:t>)</a:t>
-            </a:r>
-            <a:endParaRPr lang="de-DE" dirty="0"/>
-          </a:p>
-        </p:txBody>
-      </p:sp>
-      <p:sp>
-        <p:nvSpPr>
           <p:cNvPr id="138" name="Rechteck 137"/>
           <p:cNvSpPr/>
           <p:nvPr/>
@@ -6523,7 +6381,7 @@
               <a:t>section</a:t>
             </a:r>
             <a:r>
-              <a:rPr lang="de-DE" sz="1100" dirty="0" smtClean="0">
+              <a:rPr lang="de-DE" sz="1100" smtClean="0">
                 <a:solidFill>
                   <a:srgbClr val="FF0000"/>
                 </a:solidFill>
@@ -6531,12 +6389,12 @@
               <a:t> </a:t>
             </a:r>
             <a:r>
-              <a:rPr lang="de-DE" sz="1100" dirty="0" err="1" smtClean="0">
+              <a:rPr lang="de-DE" sz="1100" smtClean="0">
                 <a:solidFill>
                   <a:srgbClr val="FF0000"/>
                 </a:solidFill>
               </a:rPr>
-              <a:t>x.x</a:t>
+              <a:t>6.5</a:t>
             </a:r>
             <a:endParaRPr lang="de-DE" sz="1100" dirty="0">
               <a:solidFill>
@@ -6589,106 +6447,6 @@
           </a:p>
         </p:txBody>
       </p:sp>
-      <p:sp>
-        <p:nvSpPr>
-          <p:cNvPr id="88" name="Rounded Rectangle 166"/>
-          <p:cNvSpPr/>
-          <p:nvPr/>
-        </p:nvSpPr>
-        <p:spPr>
-          <a:xfrm>
-            <a:off x="8100392" y="4869160"/>
-            <a:ext cx="864096" cy="792088"/>
-          </a:xfrm>
-          <a:prstGeom prst="roundRect">
-            <a:avLst>
-              <a:gd name="adj" fmla="val 7849"/>
-            </a:avLst>
-          </a:prstGeom>
-          <a:solidFill>
-            <a:schemeClr val="bg1"/>
-          </a:solidFill>
-          <a:ln w="19050">
-            <a:solidFill>
-              <a:schemeClr val="bg1">
-                <a:lumMod val="65000"/>
-              </a:schemeClr>
-            </a:solidFill>
-          </a:ln>
-          <a:effectLst/>
-        </p:spPr>
-        <p:style>
-          <a:lnRef idx="1">
-            <a:schemeClr val="accent1"/>
-          </a:lnRef>
-          <a:fillRef idx="3">
-            <a:schemeClr val="accent1"/>
-          </a:fillRef>
-          <a:effectRef idx="2">
-            <a:schemeClr val="accent1"/>
-          </a:effectRef>
-          <a:fontRef idx="minor">
-            <a:schemeClr val="lt1"/>
-          </a:fontRef>
-        </p:style>
-        <p:txBody>
-          <a:bodyPr rtlCol="0" anchor="ctr"/>
-          <a:lstStyle/>
-          <a:p>
-            <a:pPr algn="ctr"/>
-            <a:r>
-              <a:rPr lang="en-GB" dirty="0" smtClean="0"/>
-              <a:t>v</a:t>
-            </a:r>
-            <a:endParaRPr lang="en-GB" dirty="0"/>
-          </a:p>
-        </p:txBody>
-      </p:sp>
-      <p:sp>
-        <p:nvSpPr>
-          <p:cNvPr id="89" name="TextBox 167"/>
-          <p:cNvSpPr txBox="1"/>
-          <p:nvPr/>
-        </p:nvSpPr>
-        <p:spPr>
-          <a:xfrm>
-            <a:off x="8028384" y="4869160"/>
-            <a:ext cx="1008112" cy="523220"/>
-          </a:xfrm>
-          <a:prstGeom prst="rect">
-            <a:avLst/>
-          </a:prstGeom>
-          <a:noFill/>
-        </p:spPr>
-        <p:txBody>
-          <a:bodyPr wrap="square" rtlCol="0">
-            <a:spAutoFit/>
-          </a:bodyPr>
-          <a:lstStyle/>
-          <a:p>
-            <a:pPr algn="ctr"/>
-            <a:r>
-              <a:rPr lang="en-GB" sz="1400" b="1" dirty="0" smtClean="0">
-                <a:solidFill>
-                  <a:schemeClr val="tx1">
-                    <a:lumMod val="65000"/>
-                    <a:lumOff val="35000"/>
-                  </a:schemeClr>
-                </a:solidFill>
-              </a:rPr>
-              <a:t>Semantic adaptation</a:t>
-            </a:r>
-            <a:endParaRPr lang="en-GB" sz="1400" b="1" dirty="0">
-              <a:solidFill>
-                <a:schemeClr val="tx1">
-                  <a:lumMod val="65000"/>
-                  <a:lumOff val="35000"/>
-                </a:schemeClr>
-              </a:solidFill>
-            </a:endParaRPr>
-          </a:p>
-        </p:txBody>
-      </p:sp>
       <p:cxnSp>
         <p:nvCxnSpPr>
           <p:cNvPr id="90" name="Straight Arrow Connector 30"/>
@@ -6697,7 +6455,7 @@
         </p:nvCxnSpPr>
         <p:spPr>
           <a:xfrm>
-            <a:off x="8532440" y="4077652"/>
+            <a:off x="8444147" y="2934817"/>
             <a:ext cx="0" cy="791508"/>
           </a:xfrm>
           <a:prstGeom prst="straightConnector1">
@@ -6730,97 +6488,61 @@
       </p:cxnSp>
       <p:sp>
         <p:nvSpPr>
-          <p:cNvPr id="91" name="TextBox 172"/>
-          <p:cNvSpPr txBox="1"/>
+          <p:cNvPr id="96" name="Rechteck 95"/>
+          <p:cNvSpPr/>
           <p:nvPr/>
         </p:nvSpPr>
         <p:spPr>
           <a:xfrm>
-            <a:off x="8536763" y="4409782"/>
-            <a:ext cx="506870" cy="215444"/>
+            <a:off x="8050089" y="652433"/>
+            <a:ext cx="1658380" cy="872921"/>
           </a:xfrm>
           <a:prstGeom prst="rect">
             <a:avLst/>
           </a:prstGeom>
           <a:noFill/>
-        </p:spPr>
-        <p:txBody>
-          <a:bodyPr wrap="none" rtlCol="0">
-            <a:spAutoFit/>
-          </a:bodyPr>
-          <a:lstStyle/>
-          <a:p>
-            <a:r>
-              <a:rPr lang="en-GB" sz="800" b="1" dirty="0" err="1" smtClean="0">
-                <a:solidFill>
-                  <a:schemeClr val="tx1">
-                    <a:lumMod val="65000"/>
-                    <a:lumOff val="35000"/>
-                  </a:schemeClr>
-                </a:solidFill>
-              </a:rPr>
-              <a:t>analyze</a:t>
-            </a:r>
-            <a:endParaRPr lang="en-GB" sz="800" b="1" dirty="0">
-              <a:solidFill>
-                <a:schemeClr val="tx1">
-                  <a:lumMod val="65000"/>
-                  <a:lumOff val="35000"/>
-                </a:schemeClr>
-              </a:solidFill>
-            </a:endParaRPr>
-          </a:p>
-        </p:txBody>
-      </p:sp>
-      <p:cxnSp>
-        <p:nvCxnSpPr>
-          <p:cNvPr id="93" name="Straight Arrow Connector 30"/>
-          <p:cNvCxnSpPr/>
-          <p:nvPr/>
-        </p:nvCxnSpPr>
-        <p:spPr>
-          <a:xfrm flipV="1">
-            <a:off x="8460432" y="4094561"/>
-            <a:ext cx="0" cy="782983"/>
-          </a:xfrm>
-          <a:prstGeom prst="straightConnector1">
-            <a:avLst/>
-          </a:prstGeom>
-          <a:ln w="19050">
+          <a:ln>
             <a:solidFill>
-              <a:schemeClr val="bg1">
-                <a:lumMod val="65000"/>
-              </a:schemeClr>
+              <a:srgbClr val="FF0000"/>
             </a:solidFill>
-            <a:tailEnd type="triangle"/>
+            <a:prstDash val="dash"/>
           </a:ln>
-          <a:effectLst/>
         </p:spPr>
         <p:style>
           <a:lnRef idx="2">
-            <a:schemeClr val="accent1"/>
+            <a:schemeClr val="accent1">
+              <a:shade val="50000"/>
+            </a:schemeClr>
           </a:lnRef>
-          <a:fillRef idx="0">
+          <a:fillRef idx="1">
             <a:schemeClr val="accent1"/>
           </a:fillRef>
-          <a:effectRef idx="1">
+          <a:effectRef idx="0">
             <a:schemeClr val="accent1"/>
           </a:effectRef>
           <a:fontRef idx="minor">
-            <a:schemeClr val="tx1"/>
+            <a:schemeClr val="lt1"/>
           </a:fontRef>
         </p:style>
-      </p:cxnSp>
-      <p:sp>
-        <p:nvSpPr>
-          <p:cNvPr id="94" name="TextBox 172"/>
+        <p:txBody>
+          <a:bodyPr rtlCol="0" anchor="ctr"/>
+          <a:lstStyle/>
+          <a:p>
+            <a:pPr algn="ctr"/>
+            <a:endParaRPr lang="de-DE"/>
+          </a:p>
+        </p:txBody>
+      </p:sp>
+      <p:sp>
+        <p:nvSpPr>
+          <p:cNvPr id="98" name="Textfeld 97"/>
           <p:cNvSpPr txBox="1"/>
           <p:nvPr/>
         </p:nvSpPr>
         <p:spPr>
           <a:xfrm>
-            <a:off x="7859111" y="4450536"/>
-            <a:ext cx="498855" cy="215444"/>
+            <a:off x="8055953" y="683404"/>
+            <a:ext cx="829331" cy="261610"/>
           </a:xfrm>
           <a:prstGeom prst="rect">
             <a:avLst/>
@@ -6828,28 +6550,155 @@
           <a:noFill/>
         </p:spPr>
         <p:txBody>
-          <a:bodyPr wrap="none" rtlCol="0">
+          <a:bodyPr wrap="square" rtlCol="0">
             <a:spAutoFit/>
           </a:bodyPr>
           <a:lstStyle/>
           <a:p>
             <a:r>
-              <a:rPr lang="en-GB" sz="800" b="1" dirty="0" smtClean="0">
+              <a:rPr lang="de-DE" sz="1100" dirty="0" err="1" smtClean="0">
                 <a:solidFill>
-                  <a:schemeClr val="tx1">
-                    <a:lumMod val="65000"/>
-                    <a:lumOff val="35000"/>
-                  </a:schemeClr>
+                  <a:srgbClr val="FF0000"/>
                 </a:solidFill>
               </a:rPr>
-              <a:t>replace</a:t>
-            </a:r>
-            <a:endParaRPr lang="en-GB" sz="800" b="1" dirty="0">
+              <a:t>section</a:t>
+            </a:r>
+            <a:r>
+              <a:rPr lang="de-DE" sz="1100" dirty="0" smtClean="0">
+                <a:solidFill>
+                  <a:srgbClr val="FF0000"/>
+                </a:solidFill>
+              </a:rPr>
+              <a:t> </a:t>
+            </a:r>
+            <a:r>
+              <a:rPr lang="de-DE" sz="1100" dirty="0" smtClean="0">
+                <a:solidFill>
+                  <a:srgbClr val="FF0000"/>
+                </a:solidFill>
+              </a:rPr>
+              <a:t>6</a:t>
+            </a:r>
+            <a:r>
+              <a:rPr lang="de-DE" sz="1100" dirty="0" smtClean="0">
+                <a:solidFill>
+                  <a:srgbClr val="FF0000"/>
+                </a:solidFill>
+              </a:rPr>
+              <a:t>.3</a:t>
+            </a:r>
+            <a:endParaRPr lang="de-DE" sz="1100" dirty="0">
               <a:solidFill>
-                <a:schemeClr val="tx1">
-                  <a:lumMod val="65000"/>
-                  <a:lumOff val="35000"/>
-                </a:schemeClr>
+                <a:srgbClr val="FF0000"/>
+              </a:solidFill>
+            </a:endParaRPr>
+          </a:p>
+        </p:txBody>
+      </p:sp>
+      <p:sp>
+        <p:nvSpPr>
+          <p:cNvPr id="100" name="Rechteck 99"/>
+          <p:cNvSpPr/>
+          <p:nvPr/>
+        </p:nvSpPr>
+        <p:spPr>
+          <a:xfrm>
+            <a:off x="7991282" y="2213868"/>
+            <a:ext cx="1152718" cy="960745"/>
+          </a:xfrm>
+          <a:prstGeom prst="rect">
+            <a:avLst/>
+          </a:prstGeom>
+          <a:noFill/>
+          <a:ln>
+            <a:solidFill>
+              <a:srgbClr val="FF0000"/>
+            </a:solidFill>
+            <a:prstDash val="dash"/>
+          </a:ln>
+        </p:spPr>
+        <p:style>
+          <a:lnRef idx="2">
+            <a:schemeClr val="accent1">
+              <a:shade val="50000"/>
+            </a:schemeClr>
+          </a:lnRef>
+          <a:fillRef idx="1">
+            <a:schemeClr val="accent1"/>
+          </a:fillRef>
+          <a:effectRef idx="0">
+            <a:schemeClr val="accent1"/>
+          </a:effectRef>
+          <a:fontRef idx="minor">
+            <a:schemeClr val="lt1"/>
+          </a:fontRef>
+        </p:style>
+        <p:txBody>
+          <a:bodyPr rtlCol="0" anchor="ctr"/>
+          <a:lstStyle/>
+          <a:p>
+            <a:pPr algn="ctr"/>
+            <a:endParaRPr lang="de-DE"/>
+          </a:p>
+        </p:txBody>
+      </p:sp>
+      <p:sp>
+        <p:nvSpPr>
+          <p:cNvPr id="101" name="Textfeld 100"/>
+          <p:cNvSpPr txBox="1"/>
+          <p:nvPr/>
+        </p:nvSpPr>
+        <p:spPr>
+          <a:xfrm>
+            <a:off x="8021916" y="2228049"/>
+            <a:ext cx="829331" cy="261610"/>
+          </a:xfrm>
+          <a:prstGeom prst="rect">
+            <a:avLst/>
+          </a:prstGeom>
+          <a:noFill/>
+        </p:spPr>
+        <p:txBody>
+          <a:bodyPr wrap="square" rtlCol="0">
+            <a:spAutoFit/>
+          </a:bodyPr>
+          <a:lstStyle/>
+          <a:p>
+            <a:r>
+              <a:rPr lang="de-DE" sz="1100" dirty="0" err="1" smtClean="0">
+                <a:solidFill>
+                  <a:srgbClr val="FF0000"/>
+                </a:solidFill>
+              </a:rPr>
+              <a:t>section</a:t>
+            </a:r>
+            <a:r>
+              <a:rPr lang="de-DE" sz="1100" dirty="0" smtClean="0">
+                <a:solidFill>
+                  <a:srgbClr val="FF0000"/>
+                </a:solidFill>
+              </a:rPr>
+              <a:t> </a:t>
+            </a:r>
+            <a:r>
+              <a:rPr lang="de-DE" sz="1100" dirty="0" smtClean="0">
+                <a:solidFill>
+                  <a:srgbClr val="FF0000"/>
+                </a:solidFill>
+              </a:rPr>
+              <a:t>6</a:t>
+            </a:r>
+            <a:r>
+              <a:rPr lang="de-DE" sz="1100" dirty="0" smtClean="0">
+                <a:solidFill>
+                  <a:srgbClr val="FF0000"/>
+                </a:solidFill>
+              </a:rPr>
+              <a:t>.4</a:t>
+            </a:r>
+            <a:endParaRPr lang="de-DE" sz="1100" dirty="0">
+              <a:solidFill>
+                <a:srgbClr val="FF0000"/>
               </a:solidFill>
             </a:endParaRPr>
           </a:p>
@@ -7722,7 +7571,7 @@
                                           </p:stCondLst>
                                         </p:cTn>
                                         <p:tgtEl>
-                                          <p:spTgt spid="64"/>
+                                          <p:spTgt spid="14"/>
                                         </p:tgtEl>
                                         <p:attrNameLst>
                                           <p:attrName>style.visibility</p:attrName>
@@ -7735,41 +7584,6 @@
                                     <p:animEffect transition="in" filter="fade">
                                       <p:cBhvr>
                                         <p:cTn id="78" dur="500"/>
-                                        <p:tgtEl>
-                                          <p:spTgt spid="64"/>
-                                        </p:tgtEl>
-                                      </p:cBhvr>
-                                    </p:animEffect>
-                                  </p:childTnLst>
-                                </p:cTn>
-                              </p:par>
-                              <p:par>
-                                <p:cTn id="79" presetID="10" presetClass="entr" presetSubtype="0" fill="hold" grpId="0" nodeType="withEffect">
-                                  <p:stCondLst>
-                                    <p:cond delay="0"/>
-                                  </p:stCondLst>
-                                  <p:childTnLst>
-                                    <p:set>
-                                      <p:cBhvr>
-                                        <p:cTn id="80" dur="1" fill="hold">
-                                          <p:stCondLst>
-                                            <p:cond delay="0"/>
-                                          </p:stCondLst>
-                                        </p:cTn>
-                                        <p:tgtEl>
-                                          <p:spTgt spid="14"/>
-                                        </p:tgtEl>
-                                        <p:attrNameLst>
-                                          <p:attrName>style.visibility</p:attrName>
-                                        </p:attrNameLst>
-                                      </p:cBhvr>
-                                      <p:to>
-                                        <p:strVal val="visible"/>
-                                      </p:to>
-                                    </p:set>
-                                    <p:animEffect transition="in" filter="fade">
-                                      <p:cBhvr>
-                                        <p:cTn id="81" dur="500"/>
                                         <p:tgtEl>
                                           <p:spTgt spid="14"/>
                                         </p:tgtEl>
@@ -7785,32 +7599,67 @@
                     </p:cTn>
                   </p:par>
                   <p:par>
-                    <p:cTn id="82" fill="hold">
+                    <p:cTn id="79" fill="hold">
                       <p:stCondLst>
                         <p:cond delay="indefinite"/>
                       </p:stCondLst>
                       <p:childTnLst>
                         <p:par>
-                          <p:cTn id="83" fill="hold">
+                          <p:cTn id="80" fill="hold">
                             <p:stCondLst>
                               <p:cond delay="0"/>
                             </p:stCondLst>
                             <p:childTnLst>
                               <p:par>
-                                <p:cTn id="84" presetID="10" presetClass="entr" presetSubtype="0" fill="hold" grpId="0" nodeType="clickEffect">
+                                <p:cTn id="81" presetID="10" presetClass="entr" presetSubtype="0" fill="hold" grpId="0" nodeType="clickEffect">
                                   <p:stCondLst>
                                     <p:cond delay="0"/>
                                   </p:stCondLst>
                                   <p:childTnLst>
                                     <p:set>
                                       <p:cBhvr>
+                                        <p:cTn id="82" dur="1" fill="hold">
+                                          <p:stCondLst>
+                                            <p:cond delay="0"/>
+                                          </p:stCondLst>
+                                        </p:cTn>
+                                        <p:tgtEl>
+                                          <p:spTgt spid="5"/>
+                                        </p:tgtEl>
+                                        <p:attrNameLst>
+                                          <p:attrName>style.visibility</p:attrName>
+                                        </p:attrNameLst>
+                                      </p:cBhvr>
+                                      <p:to>
+                                        <p:strVal val="visible"/>
+                                      </p:to>
+                                    </p:set>
+                                    <p:animEffect transition="in" filter="fade">
+                                      <p:cBhvr>
+                                        <p:cTn id="83" dur="500"/>
+                                        <p:tgtEl>
+                                          <p:spTgt spid="5"/>
+                                        </p:tgtEl>
+                                      </p:cBhvr>
+                                    </p:animEffect>
+                                  </p:childTnLst>
+                                </p:cTn>
+                              </p:par>
+                              <p:par>
+                                <p:cTn id="84" presetID="10" presetClass="entr" presetSubtype="0" fill="hold" grpId="0" nodeType="withEffect">
+                                  <p:stCondLst>
+                                    <p:cond delay="0"/>
+                                  </p:stCondLst>
+                                  <p:childTnLst>
+                                    <p:set>
+                                      <p:cBhvr>
                                         <p:cTn id="85" dur="1" fill="hold">
                                           <p:stCondLst>
                                             <p:cond delay="0"/>
                                           </p:stCondLst>
                                         </p:cTn>
                                         <p:tgtEl>
-                                          <p:spTgt spid="5"/>
+                                          <p:spTgt spid="6"/>
                                         </p:tgtEl>
                                         <p:attrNameLst>
                                           <p:attrName>style.visibility</p:attrName>
@@ -7824,7 +7673,7 @@
                                       <p:cBhvr>
                                         <p:cTn id="86" dur="500"/>
                                         <p:tgtEl>
-                                          <p:spTgt spid="5"/>
+                                          <p:spTgt spid="6"/>
                                         </p:tgtEl>
                                       </p:cBhvr>
                                     </p:animEffect>
@@ -7845,7 +7694,7 @@
                                           </p:stCondLst>
                                         </p:cTn>
                                         <p:tgtEl>
-                                          <p:spTgt spid="6"/>
+                                          <p:spTgt spid="7"/>
                                         </p:tgtEl>
                                         <p:attrNameLst>
                                           <p:attrName>style.visibility</p:attrName>
@@ -7859,7 +7708,7 @@
                                       <p:cBhvr>
                                         <p:cTn id="89" dur="500"/>
                                         <p:tgtEl>
-                                          <p:spTgt spid="6"/>
+                                          <p:spTgt spid="7"/>
                                         </p:tgtEl>
                                       </p:cBhvr>
                                     </p:animEffect>
@@ -7880,7 +7729,7 @@
                                           </p:stCondLst>
                                         </p:cTn>
                                         <p:tgtEl>
-                                          <p:spTgt spid="7"/>
+                                          <p:spTgt spid="8"/>
                                         </p:tgtEl>
                                         <p:attrNameLst>
                                           <p:attrName>style.visibility</p:attrName>
@@ -7894,7 +7743,7 @@
                                       <p:cBhvr>
                                         <p:cTn id="92" dur="500"/>
                                         <p:tgtEl>
-                                          <p:spTgt spid="7"/>
+                                          <p:spTgt spid="8"/>
                                         </p:tgtEl>
                                       </p:cBhvr>
                                     </p:animEffect>
@@ -7915,7 +7764,7 @@
                                           </p:stCondLst>
                                         </p:cTn>
                                         <p:tgtEl>
-                                          <p:spTgt spid="8"/>
+                                          <p:spTgt spid="9"/>
                                         </p:tgtEl>
                                         <p:attrNameLst>
                                           <p:attrName>style.visibility</p:attrName>
@@ -7929,7 +7778,7 @@
                                       <p:cBhvr>
                                         <p:cTn id="95" dur="500"/>
                                         <p:tgtEl>
-                                          <p:spTgt spid="8"/>
+                                          <p:spTgt spid="9"/>
                                         </p:tgtEl>
                                       </p:cBhvr>
                                     </p:animEffect>
@@ -7950,7 +7799,7 @@
                                           </p:stCondLst>
                                         </p:cTn>
                                         <p:tgtEl>
-                                          <p:spTgt spid="9"/>
+                                          <p:spTgt spid="10"/>
                                         </p:tgtEl>
                                         <p:attrNameLst>
                                           <p:attrName>style.visibility</p:attrName>
@@ -7964,7 +7813,7 @@
                                       <p:cBhvr>
                                         <p:cTn id="98" dur="500"/>
                                         <p:tgtEl>
-                                          <p:spTgt spid="9"/>
+                                          <p:spTgt spid="10"/>
                                         </p:tgtEl>
                                       </p:cBhvr>
                                     </p:animEffect>
@@ -7972,7 +7821,7 @@
                                 </p:cTn>
                               </p:par>
                               <p:par>
-                                <p:cTn id="99" presetID="10" presetClass="entr" presetSubtype="0" fill="hold" grpId="0" nodeType="withEffect">
+                                <p:cTn id="99" presetID="10" presetClass="entr" presetSubtype="0" fill="hold" nodeType="withEffect">
                                   <p:stCondLst>
                                     <p:cond delay="0"/>
                                   </p:stCondLst>
@@ -7985,7 +7834,7 @@
                                           </p:stCondLst>
                                         </p:cTn>
                                         <p:tgtEl>
-                                          <p:spTgt spid="10"/>
+                                          <p:spTgt spid="11"/>
                                         </p:tgtEl>
                                         <p:attrNameLst>
                                           <p:attrName>style.visibility</p:attrName>
@@ -7999,7 +7848,7 @@
                                       <p:cBhvr>
                                         <p:cTn id="101" dur="500"/>
                                         <p:tgtEl>
-                                          <p:spTgt spid="10"/>
+                                          <p:spTgt spid="11"/>
                                         </p:tgtEl>
                                       </p:cBhvr>
                                     </p:animEffect>
@@ -8007,7 +7856,7 @@
                                 </p:cTn>
                               </p:par>
                               <p:par>
-                                <p:cTn id="102" presetID="10" presetClass="entr" presetSubtype="0" fill="hold" nodeType="withEffect">
+                                <p:cTn id="102" presetID="10" presetClass="entr" presetSubtype="0" fill="hold" grpId="0" nodeType="withEffect">
                                   <p:stCondLst>
                                     <p:cond delay="0"/>
                                   </p:stCondLst>
@@ -8020,7 +7869,7 @@
                                           </p:stCondLst>
                                         </p:cTn>
                                         <p:tgtEl>
-                                          <p:spTgt spid="11"/>
+                                          <p:spTgt spid="58"/>
                                         </p:tgtEl>
                                         <p:attrNameLst>
                                           <p:attrName>style.visibility</p:attrName>
@@ -8034,7 +7883,7 @@
                                       <p:cBhvr>
                                         <p:cTn id="104" dur="500"/>
                                         <p:tgtEl>
-                                          <p:spTgt spid="11"/>
+                                          <p:spTgt spid="58"/>
                                         </p:tgtEl>
                                       </p:cBhvr>
                                     </p:animEffect>
@@ -8042,7 +7891,7 @@
                                 </p:cTn>
                               </p:par>
                               <p:par>
-                                <p:cTn id="105" presetID="10" presetClass="entr" presetSubtype="0" fill="hold" grpId="0" nodeType="withEffect">
+                                <p:cTn id="105" presetID="10" presetClass="entr" presetSubtype="0" fill="hold" nodeType="withEffect">
                                   <p:stCondLst>
                                     <p:cond delay="0"/>
                                   </p:stCondLst>
@@ -8055,7 +7904,7 @@
                                           </p:stCondLst>
                                         </p:cTn>
                                         <p:tgtEl>
-                                          <p:spTgt spid="58"/>
+                                          <p:spTgt spid="62"/>
                                         </p:tgtEl>
                                         <p:attrNameLst>
                                           <p:attrName>style.visibility</p:attrName>
@@ -8069,7 +7918,7 @@
                                       <p:cBhvr>
                                         <p:cTn id="107" dur="500"/>
                                         <p:tgtEl>
-                                          <p:spTgt spid="58"/>
+                                          <p:spTgt spid="62"/>
                                         </p:tgtEl>
                                       </p:cBhvr>
                                     </p:animEffect>
@@ -8077,7 +7926,7 @@
                                 </p:cTn>
                               </p:par>
                               <p:par>
-                                <p:cTn id="108" presetID="10" presetClass="entr" presetSubtype="0" fill="hold" nodeType="withEffect">
+                                <p:cTn id="108" presetID="10" presetClass="entr" presetSubtype="0" fill="hold" grpId="0" nodeType="withEffect">
                                   <p:stCondLst>
                                     <p:cond delay="0"/>
                                   </p:stCondLst>
@@ -8090,7 +7939,7 @@
                                           </p:stCondLst>
                                         </p:cTn>
                                         <p:tgtEl>
-                                          <p:spTgt spid="62"/>
+                                          <p:spTgt spid="63"/>
                                         </p:tgtEl>
                                         <p:attrNameLst>
                                           <p:attrName>style.visibility</p:attrName>
@@ -8104,7 +7953,7 @@
                                       <p:cBhvr>
                                         <p:cTn id="110" dur="500"/>
                                         <p:tgtEl>
-                                          <p:spTgt spid="62"/>
+                                          <p:spTgt spid="63"/>
                                         </p:tgtEl>
                                       </p:cBhvr>
                                     </p:animEffect>
@@ -8125,7 +7974,7 @@
                                           </p:stCondLst>
                                         </p:cTn>
                                         <p:tgtEl>
-                                          <p:spTgt spid="63"/>
+                                          <p:spTgt spid="68"/>
                                         </p:tgtEl>
                                         <p:attrNameLst>
                                           <p:attrName>style.visibility</p:attrName>
@@ -8139,7 +7988,7 @@
                                       <p:cBhvr>
                                         <p:cTn id="113" dur="500"/>
                                         <p:tgtEl>
-                                          <p:spTgt spid="63"/>
+                                          <p:spTgt spid="68"/>
                                         </p:tgtEl>
                                       </p:cBhvr>
                                     </p:animEffect>
@@ -8160,7 +8009,7 @@
                                           </p:stCondLst>
                                         </p:cTn>
                                         <p:tgtEl>
-                                          <p:spTgt spid="68"/>
+                                          <p:spTgt spid="69"/>
                                         </p:tgtEl>
                                         <p:attrNameLst>
                                           <p:attrName>style.visibility</p:attrName>
@@ -8174,7 +8023,7 @@
                                       <p:cBhvr>
                                         <p:cTn id="116" dur="500"/>
                                         <p:tgtEl>
-                                          <p:spTgt spid="68"/>
+                                          <p:spTgt spid="69"/>
                                         </p:tgtEl>
                                       </p:cBhvr>
                                     </p:animEffect>
@@ -8195,7 +8044,7 @@
                                           </p:stCondLst>
                                         </p:cTn>
                                         <p:tgtEl>
-                                          <p:spTgt spid="69"/>
+                                          <p:spTgt spid="70"/>
                                         </p:tgtEl>
                                         <p:attrNameLst>
                                           <p:attrName>style.visibility</p:attrName>
@@ -8208,41 +8057,6 @@
                                     <p:animEffect transition="in" filter="fade">
                                       <p:cBhvr>
                                         <p:cTn id="119" dur="500"/>
-                                        <p:tgtEl>
-                                          <p:spTgt spid="69"/>
-                                        </p:tgtEl>
-                                      </p:cBhvr>
-                                    </p:animEffect>
-                                  </p:childTnLst>
-                                </p:cTn>
-                              </p:par>
-                              <p:par>
-                                <p:cTn id="120" presetID="10" presetClass="entr" presetSubtype="0" fill="hold" grpId="0" nodeType="withEffect">
-                                  <p:stCondLst>
-                                    <p:cond delay="0"/>
-                                  </p:stCondLst>
-                                  <p:childTnLst>
-                                    <p:set>
-                                      <p:cBhvr>
-                                        <p:cTn id="121" dur="1" fill="hold">
-                                          <p:stCondLst>
-                                            <p:cond delay="0"/>
-                                          </p:stCondLst>
-                                        </p:cTn>
-                                        <p:tgtEl>
-                                          <p:spTgt spid="70"/>
-                                        </p:tgtEl>
-                                        <p:attrNameLst>
-                                          <p:attrName>style.visibility</p:attrName>
-                                        </p:attrNameLst>
-                                      </p:cBhvr>
-                                      <p:to>
-                                        <p:strVal val="visible"/>
-                                      </p:to>
-                                    </p:set>
-                                    <p:animEffect transition="in" filter="fade">
-                                      <p:cBhvr>
-                                        <p:cTn id="122" dur="500"/>
                                         <p:tgtEl>
                                           <p:spTgt spid="70"/>
                                         </p:tgtEl>
@@ -8258,32 +8072,67 @@
                     </p:cTn>
                   </p:par>
                   <p:par>
-                    <p:cTn id="123" fill="hold">
+                    <p:cTn id="120" fill="hold">
                       <p:stCondLst>
                         <p:cond delay="indefinite"/>
                       </p:stCondLst>
                       <p:childTnLst>
                         <p:par>
-                          <p:cTn id="124" fill="hold">
+                          <p:cTn id="121" fill="hold">
                             <p:stCondLst>
                               <p:cond delay="0"/>
                             </p:stCondLst>
                             <p:childTnLst>
                               <p:par>
-                                <p:cTn id="125" presetID="10" presetClass="entr" presetSubtype="0" fill="hold" grpId="0" nodeType="clickEffect">
+                                <p:cTn id="122" presetID="10" presetClass="entr" presetSubtype="0" fill="hold" grpId="0" nodeType="clickEffect">
                                   <p:stCondLst>
                                     <p:cond delay="0"/>
                                   </p:stCondLst>
                                   <p:childTnLst>
                                     <p:set>
                                       <p:cBhvr>
+                                        <p:cTn id="123" dur="1" fill="hold">
+                                          <p:stCondLst>
+                                            <p:cond delay="0"/>
+                                          </p:stCondLst>
+                                        </p:cTn>
+                                        <p:tgtEl>
+                                          <p:spTgt spid="12"/>
+                                        </p:tgtEl>
+                                        <p:attrNameLst>
+                                          <p:attrName>style.visibility</p:attrName>
+                                        </p:attrNameLst>
+                                      </p:cBhvr>
+                                      <p:to>
+                                        <p:strVal val="visible"/>
+                                      </p:to>
+                                    </p:set>
+                                    <p:animEffect transition="in" filter="fade">
+                                      <p:cBhvr>
+                                        <p:cTn id="124" dur="500"/>
+                                        <p:tgtEl>
+                                          <p:spTgt spid="12"/>
+                                        </p:tgtEl>
+                                      </p:cBhvr>
+                                    </p:animEffect>
+                                  </p:childTnLst>
+                                </p:cTn>
+                              </p:par>
+                              <p:par>
+                                <p:cTn id="125" presetID="10" presetClass="entr" presetSubtype="0" fill="hold" grpId="0" nodeType="withEffect">
+                                  <p:stCondLst>
+                                    <p:cond delay="0"/>
+                                  </p:stCondLst>
+                                  <p:childTnLst>
+                                    <p:set>
+                                      <p:cBhvr>
                                         <p:cTn id="126" dur="1" fill="hold">
                                           <p:stCondLst>
                                             <p:cond delay="0"/>
                                           </p:stCondLst>
                                         </p:cTn>
                                         <p:tgtEl>
-                                          <p:spTgt spid="12"/>
+                                          <p:spTgt spid="13"/>
                                         </p:tgtEl>
                                         <p:attrNameLst>
                                           <p:attrName>style.visibility</p:attrName>
@@ -8297,7 +8146,7 @@
                                       <p:cBhvr>
                                         <p:cTn id="127" dur="500"/>
                                         <p:tgtEl>
-                                          <p:spTgt spid="12"/>
+                                          <p:spTgt spid="13"/>
                                         </p:tgtEl>
                                       </p:cBhvr>
                                     </p:animEffect>
@@ -8305,7 +8154,7 @@
                                 </p:cTn>
                               </p:par>
                               <p:par>
-                                <p:cTn id="128" presetID="10" presetClass="entr" presetSubtype="0" fill="hold" grpId="0" nodeType="withEffect">
+                                <p:cTn id="128" presetID="10" presetClass="entr" presetSubtype="0" fill="hold" nodeType="withEffect">
                                   <p:stCondLst>
                                     <p:cond delay="0"/>
                                   </p:stCondLst>
@@ -8318,7 +8167,7 @@
                                           </p:stCondLst>
                                         </p:cTn>
                                         <p:tgtEl>
-                                          <p:spTgt spid="13"/>
+                                          <p:spTgt spid="65"/>
                                         </p:tgtEl>
                                         <p:attrNameLst>
                                           <p:attrName>style.visibility</p:attrName>
@@ -8332,7 +8181,7 @@
                                       <p:cBhvr>
                                         <p:cTn id="130" dur="500"/>
                                         <p:tgtEl>
-                                          <p:spTgt spid="13"/>
+                                          <p:spTgt spid="65"/>
                                         </p:tgtEl>
                                       </p:cBhvr>
                                     </p:animEffect>
@@ -8353,7 +8202,7 @@
                                           </p:stCondLst>
                                         </p:cTn>
                                         <p:tgtEl>
-                                          <p:spTgt spid="65"/>
+                                          <p:spTgt spid="66"/>
                                         </p:tgtEl>
                                         <p:attrNameLst>
                                           <p:attrName>style.visibility</p:attrName>
@@ -8367,7 +8216,7 @@
                                       <p:cBhvr>
                                         <p:cTn id="133" dur="500"/>
                                         <p:tgtEl>
-                                          <p:spTgt spid="65"/>
+                                          <p:spTgt spid="66"/>
                                         </p:tgtEl>
                                       </p:cBhvr>
                                     </p:animEffect>
@@ -8375,7 +8224,7 @@
                                 </p:cTn>
                               </p:par>
                               <p:par>
-                                <p:cTn id="134" presetID="10" presetClass="entr" presetSubtype="0" fill="hold" nodeType="withEffect">
+                                <p:cTn id="134" presetID="10" presetClass="entr" presetSubtype="0" fill="hold" grpId="0" nodeType="withEffect">
                                   <p:stCondLst>
                                     <p:cond delay="0"/>
                                   </p:stCondLst>
@@ -8388,7 +8237,7 @@
                                           </p:stCondLst>
                                         </p:cTn>
                                         <p:tgtEl>
-                                          <p:spTgt spid="66"/>
+                                          <p:spTgt spid="67"/>
                                         </p:tgtEl>
                                         <p:attrNameLst>
                                           <p:attrName>style.visibility</p:attrName>
@@ -8401,41 +8250,6 @@
                                     <p:animEffect transition="in" filter="fade">
                                       <p:cBhvr>
                                         <p:cTn id="136" dur="500"/>
-                                        <p:tgtEl>
-                                          <p:spTgt spid="66"/>
-                                        </p:tgtEl>
-                                      </p:cBhvr>
-                                    </p:animEffect>
-                                  </p:childTnLst>
-                                </p:cTn>
-                              </p:par>
-                              <p:par>
-                                <p:cTn id="137" presetID="10" presetClass="entr" presetSubtype="0" fill="hold" grpId="0" nodeType="withEffect">
-                                  <p:stCondLst>
-                                    <p:cond delay="0"/>
-                                  </p:stCondLst>
-                                  <p:childTnLst>
-                                    <p:set>
-                                      <p:cBhvr>
-                                        <p:cTn id="138" dur="1" fill="hold">
-                                          <p:stCondLst>
-                                            <p:cond delay="0"/>
-                                          </p:stCondLst>
-                                        </p:cTn>
-                                        <p:tgtEl>
-                                          <p:spTgt spid="67"/>
-                                        </p:tgtEl>
-                                        <p:attrNameLst>
-                                          <p:attrName>style.visibility</p:attrName>
-                                        </p:attrNameLst>
-                                      </p:cBhvr>
-                                      <p:to>
-                                        <p:strVal val="visible"/>
-                                      </p:to>
-                                    </p:set>
-                                    <p:animEffect transition="in" filter="fade">
-                                      <p:cBhvr>
-                                        <p:cTn id="139" dur="500"/>
                                         <p:tgtEl>
                                           <p:spTgt spid="67"/>
                                         </p:tgtEl>
@@ -8451,32 +8265,67 @@
                     </p:cTn>
                   </p:par>
                   <p:par>
-                    <p:cTn id="140" fill="hold">
+                    <p:cTn id="137" fill="hold">
                       <p:stCondLst>
                         <p:cond delay="indefinite"/>
                       </p:stCondLst>
                       <p:childTnLst>
                         <p:par>
-                          <p:cTn id="141" fill="hold">
+                          <p:cTn id="138" fill="hold">
                             <p:stCondLst>
                               <p:cond delay="0"/>
                             </p:stCondLst>
                             <p:childTnLst>
                               <p:par>
-                                <p:cTn id="142" presetID="10" presetClass="entr" presetSubtype="0" fill="hold" grpId="0" nodeType="clickEffect">
+                                <p:cTn id="139" presetID="10" presetClass="entr" presetSubtype="0" fill="hold" grpId="0" nodeType="clickEffect">
                                   <p:stCondLst>
                                     <p:cond delay="0"/>
                                   </p:stCondLst>
                                   <p:childTnLst>
                                     <p:set>
                                       <p:cBhvr>
+                                        <p:cTn id="140" dur="1" fill="hold">
+                                          <p:stCondLst>
+                                            <p:cond delay="0"/>
+                                          </p:stCondLst>
+                                        </p:cTn>
+                                        <p:tgtEl>
+                                          <p:spTgt spid="19"/>
+                                        </p:tgtEl>
+                                        <p:attrNameLst>
+                                          <p:attrName>style.visibility</p:attrName>
+                                        </p:attrNameLst>
+                                      </p:cBhvr>
+                                      <p:to>
+                                        <p:strVal val="visible"/>
+                                      </p:to>
+                                    </p:set>
+                                    <p:animEffect transition="in" filter="fade">
+                                      <p:cBhvr>
+                                        <p:cTn id="141" dur="500"/>
+                                        <p:tgtEl>
+                                          <p:spTgt spid="19"/>
+                                        </p:tgtEl>
+                                      </p:cBhvr>
+                                    </p:animEffect>
+                                  </p:childTnLst>
+                                </p:cTn>
+                              </p:par>
+                              <p:par>
+                                <p:cTn id="142" presetID="10" presetClass="entr" presetSubtype="0" fill="hold" nodeType="withEffect">
+                                  <p:stCondLst>
+                                    <p:cond delay="0"/>
+                                  </p:stCondLst>
+                                  <p:childTnLst>
+                                    <p:set>
+                                      <p:cBhvr>
                                         <p:cTn id="143" dur="1" fill="hold">
                                           <p:stCondLst>
                                             <p:cond delay="0"/>
                                           </p:stCondLst>
                                         </p:cTn>
                                         <p:tgtEl>
-                                          <p:spTgt spid="19"/>
+                                          <p:spTgt spid="20"/>
                                         </p:tgtEl>
                                         <p:attrNameLst>
                                           <p:attrName>style.visibility</p:attrName>
@@ -8490,7 +8339,7 @@
                                       <p:cBhvr>
                                         <p:cTn id="144" dur="500"/>
                                         <p:tgtEl>
-                                          <p:spTgt spid="19"/>
+                                          <p:spTgt spid="20"/>
                                         </p:tgtEl>
                                       </p:cBhvr>
                                     </p:animEffect>
@@ -8498,7 +8347,7 @@
                                 </p:cTn>
                               </p:par>
                               <p:par>
-                                <p:cTn id="145" presetID="10" presetClass="entr" presetSubtype="0" fill="hold" nodeType="withEffect">
+                                <p:cTn id="145" presetID="10" presetClass="entr" presetSubtype="0" fill="hold" grpId="0" nodeType="withEffect">
                                   <p:stCondLst>
                                     <p:cond delay="0"/>
                                   </p:stCondLst>
@@ -8511,7 +8360,7 @@
                                           </p:stCondLst>
                                         </p:cTn>
                                         <p:tgtEl>
-                                          <p:spTgt spid="20"/>
+                                          <p:spTgt spid="29"/>
                                         </p:tgtEl>
                                         <p:attrNameLst>
                                           <p:attrName>style.visibility</p:attrName>
@@ -8525,7 +8374,7 @@
                                       <p:cBhvr>
                                         <p:cTn id="147" dur="500"/>
                                         <p:tgtEl>
-                                          <p:spTgt spid="20"/>
+                                          <p:spTgt spid="29"/>
                                         </p:tgtEl>
                                       </p:cBhvr>
                                     </p:animEffect>
@@ -8546,7 +8395,7 @@
                                           </p:stCondLst>
                                         </p:cTn>
                                         <p:tgtEl>
-                                          <p:spTgt spid="29"/>
+                                          <p:spTgt spid="37"/>
                                         </p:tgtEl>
                                         <p:attrNameLst>
                                           <p:attrName>style.visibility</p:attrName>
@@ -8560,7 +8409,7 @@
                                       <p:cBhvr>
                                         <p:cTn id="150" dur="500"/>
                                         <p:tgtEl>
-                                          <p:spTgt spid="29"/>
+                                          <p:spTgt spid="37"/>
                                         </p:tgtEl>
                                       </p:cBhvr>
                                     </p:animEffect>
@@ -8568,7 +8417,7 @@
                                 </p:cTn>
                               </p:par>
                               <p:par>
-                                <p:cTn id="151" presetID="10" presetClass="entr" presetSubtype="0" fill="hold" grpId="0" nodeType="withEffect">
+                                <p:cTn id="151" presetID="10" presetClass="entr" presetSubtype="0" fill="hold" nodeType="withEffect">
                                   <p:stCondLst>
                                     <p:cond delay="0"/>
                                   </p:stCondLst>
@@ -8581,7 +8430,7 @@
                                           </p:stCondLst>
                                         </p:cTn>
                                         <p:tgtEl>
-                                          <p:spTgt spid="37"/>
+                                          <p:spTgt spid="60"/>
                                         </p:tgtEl>
                                         <p:attrNameLst>
                                           <p:attrName>style.visibility</p:attrName>
@@ -8595,7 +8444,7 @@
                                       <p:cBhvr>
                                         <p:cTn id="153" dur="500"/>
                                         <p:tgtEl>
-                                          <p:spTgt spid="37"/>
+                                          <p:spTgt spid="60"/>
                                         </p:tgtEl>
                                       </p:cBhvr>
                                     </p:animEffect>
@@ -8603,7 +8452,7 @@
                                 </p:cTn>
                               </p:par>
                               <p:par>
-                                <p:cTn id="154" presetID="10" presetClass="entr" presetSubtype="0" fill="hold" nodeType="withEffect">
+                                <p:cTn id="154" presetID="10" presetClass="entr" presetSubtype="0" fill="hold" grpId="0" nodeType="withEffect">
                                   <p:stCondLst>
                                     <p:cond delay="0"/>
                                   </p:stCondLst>
@@ -8616,7 +8465,7 @@
                                           </p:stCondLst>
                                         </p:cTn>
                                         <p:tgtEl>
-                                          <p:spTgt spid="60"/>
+                                          <p:spTgt spid="61"/>
                                         </p:tgtEl>
                                         <p:attrNameLst>
                                           <p:attrName>style.visibility</p:attrName>
@@ -8629,41 +8478,6 @@
                                     <p:animEffect transition="in" filter="fade">
                                       <p:cBhvr>
                                         <p:cTn id="156" dur="500"/>
-                                        <p:tgtEl>
-                                          <p:spTgt spid="60"/>
-                                        </p:tgtEl>
-                                      </p:cBhvr>
-                                    </p:animEffect>
-                                  </p:childTnLst>
-                                </p:cTn>
-                              </p:par>
-                              <p:par>
-                                <p:cTn id="157" presetID="10" presetClass="entr" presetSubtype="0" fill="hold" grpId="0" nodeType="withEffect">
-                                  <p:stCondLst>
-                                    <p:cond delay="0"/>
-                                  </p:stCondLst>
-                                  <p:childTnLst>
-                                    <p:set>
-                                      <p:cBhvr>
-                                        <p:cTn id="158" dur="1" fill="hold">
-                                          <p:stCondLst>
-                                            <p:cond delay="0"/>
-                                          </p:stCondLst>
-                                        </p:cTn>
-                                        <p:tgtEl>
-                                          <p:spTgt spid="61"/>
-                                        </p:tgtEl>
-                                        <p:attrNameLst>
-                                          <p:attrName>style.visibility</p:attrName>
-                                        </p:attrNameLst>
-                                      </p:cBhvr>
-                                      <p:to>
-                                        <p:strVal val="visible"/>
-                                      </p:to>
-                                    </p:set>
-                                    <p:animEffect transition="in" filter="fade">
-                                      <p:cBhvr>
-                                        <p:cTn id="159" dur="500"/>
                                         <p:tgtEl>
                                           <p:spTgt spid="61"/>
                                         </p:tgtEl>
@@ -8679,32 +8493,67 @@
                     </p:cTn>
                   </p:par>
                   <p:par>
-                    <p:cTn id="160" fill="hold">
+                    <p:cTn id="157" fill="hold">
                       <p:stCondLst>
                         <p:cond delay="indefinite"/>
                       </p:stCondLst>
                       <p:childTnLst>
                         <p:par>
-                          <p:cTn id="161" fill="hold">
+                          <p:cTn id="158" fill="hold">
                             <p:stCondLst>
                               <p:cond delay="0"/>
                             </p:stCondLst>
                             <p:childTnLst>
                               <p:par>
-                                <p:cTn id="162" presetID="10" presetClass="entr" presetSubtype="0" fill="hold" nodeType="clickEffect">
+                                <p:cTn id="159" presetID="10" presetClass="entr" presetSubtype="0" fill="hold" nodeType="clickEffect">
                                   <p:stCondLst>
                                     <p:cond delay="0"/>
                                   </p:stCondLst>
                                   <p:childTnLst>
                                     <p:set>
                                       <p:cBhvr>
+                                        <p:cTn id="160" dur="1" fill="hold">
+                                          <p:stCondLst>
+                                            <p:cond delay="0"/>
+                                          </p:stCondLst>
+                                        </p:cTn>
+                                        <p:tgtEl>
+                                          <p:spTgt spid="71"/>
+                                        </p:tgtEl>
+                                        <p:attrNameLst>
+                                          <p:attrName>style.visibility</p:attrName>
+                                        </p:attrNameLst>
+                                      </p:cBhvr>
+                                      <p:to>
+                                        <p:strVal val="visible"/>
+                                      </p:to>
+                                    </p:set>
+                                    <p:animEffect transition="in" filter="fade">
+                                      <p:cBhvr>
+                                        <p:cTn id="161" dur="500"/>
+                                        <p:tgtEl>
+                                          <p:spTgt spid="71"/>
+                                        </p:tgtEl>
+                                      </p:cBhvr>
+                                    </p:animEffect>
+                                  </p:childTnLst>
+                                </p:cTn>
+                              </p:par>
+                              <p:par>
+                                <p:cTn id="162" presetID="10" presetClass="entr" presetSubtype="0" fill="hold" grpId="0" nodeType="withEffect">
+                                  <p:stCondLst>
+                                    <p:cond delay="0"/>
+                                  </p:stCondLst>
+                                  <p:childTnLst>
+                                    <p:set>
+                                      <p:cBhvr>
                                         <p:cTn id="163" dur="1" fill="hold">
                                           <p:stCondLst>
                                             <p:cond delay="0"/>
                                           </p:stCondLst>
                                         </p:cTn>
                                         <p:tgtEl>
-                                          <p:spTgt spid="71"/>
+                                          <p:spTgt spid="72"/>
                                         </p:tgtEl>
                                         <p:attrNameLst>
                                           <p:attrName>style.visibility</p:attrName>
@@ -8718,7 +8567,7 @@
                                       <p:cBhvr>
                                         <p:cTn id="164" dur="500"/>
                                         <p:tgtEl>
-                                          <p:spTgt spid="71"/>
+                                          <p:spTgt spid="72"/>
                                         </p:tgtEl>
                                       </p:cBhvr>
                                     </p:animEffect>
@@ -8726,7 +8575,7 @@
                                 </p:cTn>
                               </p:par>
                               <p:par>
-                                <p:cTn id="165" presetID="10" presetClass="entr" presetSubtype="0" fill="hold" grpId="0" nodeType="withEffect">
+                                <p:cTn id="165" presetID="10" presetClass="entr" presetSubtype="0" fill="hold" nodeType="withEffect">
                                   <p:stCondLst>
                                     <p:cond delay="0"/>
                                   </p:stCondLst>
@@ -8739,7 +8588,7 @@
                                           </p:stCondLst>
                                         </p:cTn>
                                         <p:tgtEl>
-                                          <p:spTgt spid="72"/>
+                                          <p:spTgt spid="73"/>
                                         </p:tgtEl>
                                         <p:attrNameLst>
                                           <p:attrName>style.visibility</p:attrName>
@@ -8753,7 +8602,7 @@
                                       <p:cBhvr>
                                         <p:cTn id="167" dur="500"/>
                                         <p:tgtEl>
-                                          <p:spTgt spid="72"/>
+                                          <p:spTgt spid="73"/>
                                         </p:tgtEl>
                                       </p:cBhvr>
                                     </p:animEffect>
@@ -8761,7 +8610,7 @@
                                 </p:cTn>
                               </p:par>
                               <p:par>
-                                <p:cTn id="168" presetID="10" presetClass="entr" presetSubtype="0" fill="hold" nodeType="withEffect">
+                                <p:cTn id="168" presetID="10" presetClass="entr" presetSubtype="0" fill="hold" grpId="0" nodeType="withEffect">
                                   <p:stCondLst>
                                     <p:cond delay="0"/>
                                   </p:stCondLst>
@@ -8774,7 +8623,7 @@
                                           </p:stCondLst>
                                         </p:cTn>
                                         <p:tgtEl>
-                                          <p:spTgt spid="73"/>
+                                          <p:spTgt spid="74"/>
                                         </p:tgtEl>
                                         <p:attrNameLst>
                                           <p:attrName>style.visibility</p:attrName>
@@ -8788,7 +8637,7 @@
                                       <p:cBhvr>
                                         <p:cTn id="170" dur="500"/>
                                         <p:tgtEl>
-                                          <p:spTgt spid="73"/>
+                                          <p:spTgt spid="74"/>
                                         </p:tgtEl>
                                       </p:cBhvr>
                                     </p:animEffect>
@@ -8796,7 +8645,7 @@
                                 </p:cTn>
                               </p:par>
                               <p:par>
-                                <p:cTn id="171" presetID="10" presetClass="entr" presetSubtype="0" fill="hold" grpId="0" nodeType="withEffect">
+                                <p:cTn id="171" presetID="10" presetClass="entr" presetSubtype="0" fill="hold" nodeType="withEffect">
                                   <p:stCondLst>
                                     <p:cond delay="0"/>
                                   </p:stCondLst>
@@ -8809,7 +8658,7 @@
                                           </p:stCondLst>
                                         </p:cTn>
                                         <p:tgtEl>
-                                          <p:spTgt spid="74"/>
+                                          <p:spTgt spid="75"/>
                                         </p:tgtEl>
                                         <p:attrNameLst>
                                           <p:attrName>style.visibility</p:attrName>
@@ -8823,7 +8672,7 @@
                                       <p:cBhvr>
                                         <p:cTn id="173" dur="500"/>
                                         <p:tgtEl>
-                                          <p:spTgt spid="74"/>
+                                          <p:spTgt spid="75"/>
                                         </p:tgtEl>
                                       </p:cBhvr>
                                     </p:animEffect>
@@ -8831,7 +8680,7 @@
                                 </p:cTn>
                               </p:par>
                               <p:par>
-                                <p:cTn id="174" presetID="10" presetClass="entr" presetSubtype="0" fill="hold" nodeType="withEffect">
+                                <p:cTn id="174" presetID="10" presetClass="entr" presetSubtype="0" fill="hold" grpId="0" nodeType="withEffect">
                                   <p:stCondLst>
                                     <p:cond delay="0"/>
                                   </p:stCondLst>
@@ -8844,7 +8693,7 @@
                                           </p:stCondLst>
                                         </p:cTn>
                                         <p:tgtEl>
-                                          <p:spTgt spid="75"/>
+                                          <p:spTgt spid="76"/>
                                         </p:tgtEl>
                                         <p:attrNameLst>
                                           <p:attrName>style.visibility</p:attrName>
@@ -8857,41 +8706,6 @@
                                     <p:animEffect transition="in" filter="fade">
                                       <p:cBhvr>
                                         <p:cTn id="176" dur="500"/>
-                                        <p:tgtEl>
-                                          <p:spTgt spid="75"/>
-                                        </p:tgtEl>
-                                      </p:cBhvr>
-                                    </p:animEffect>
-                                  </p:childTnLst>
-                                </p:cTn>
-                              </p:par>
-                              <p:par>
-                                <p:cTn id="177" presetID="10" presetClass="entr" presetSubtype="0" fill="hold" grpId="0" nodeType="withEffect">
-                                  <p:stCondLst>
-                                    <p:cond delay="0"/>
-                                  </p:stCondLst>
-                                  <p:childTnLst>
-                                    <p:set>
-                                      <p:cBhvr>
-                                        <p:cTn id="178" dur="1" fill="hold">
-                                          <p:stCondLst>
-                                            <p:cond delay="0"/>
-                                          </p:stCondLst>
-                                        </p:cTn>
-                                        <p:tgtEl>
-                                          <p:spTgt spid="76"/>
-                                        </p:tgtEl>
-                                        <p:attrNameLst>
-                                          <p:attrName>style.visibility</p:attrName>
-                                        </p:attrNameLst>
-                                      </p:cBhvr>
-                                      <p:to>
-                                        <p:strVal val="visible"/>
-                                      </p:to>
-                                    </p:set>
-                                    <p:animEffect transition="in" filter="fade">
-                                      <p:cBhvr>
-                                        <p:cTn id="179" dur="500"/>
                                         <p:tgtEl>
                                           <p:spTgt spid="76"/>
                                         </p:tgtEl>
@@ -8907,32 +8721,67 @@
                     </p:cTn>
                   </p:par>
                   <p:par>
-                    <p:cTn id="180" fill="hold">
+                    <p:cTn id="177" fill="hold">
                       <p:stCondLst>
                         <p:cond delay="indefinite"/>
                       </p:stCondLst>
                       <p:childTnLst>
                         <p:par>
-                          <p:cTn id="181" fill="hold">
+                          <p:cTn id="178" fill="hold">
                             <p:stCondLst>
                               <p:cond delay="0"/>
                             </p:stCondLst>
                             <p:childTnLst>
                               <p:par>
-                                <p:cTn id="182" presetID="10" presetClass="entr" presetSubtype="0" fill="hold" grpId="0" nodeType="clickEffect">
+                                <p:cTn id="179" presetID="10" presetClass="entr" presetSubtype="0" fill="hold" grpId="0" nodeType="clickEffect">
                                   <p:stCondLst>
                                     <p:cond delay="0"/>
                                   </p:stCondLst>
                                   <p:childTnLst>
                                     <p:set>
                                       <p:cBhvr>
+                                        <p:cTn id="180" dur="1" fill="hold">
+                                          <p:stCondLst>
+                                            <p:cond delay="0"/>
+                                          </p:stCondLst>
+                                        </p:cTn>
+                                        <p:tgtEl>
+                                          <p:spTgt spid="43"/>
+                                        </p:tgtEl>
+                                        <p:attrNameLst>
+                                          <p:attrName>style.visibility</p:attrName>
+                                        </p:attrNameLst>
+                                      </p:cBhvr>
+                                      <p:to>
+                                        <p:strVal val="visible"/>
+                                      </p:to>
+                                    </p:set>
+                                    <p:animEffect transition="in" filter="fade">
+                                      <p:cBhvr>
+                                        <p:cTn id="181" dur="500"/>
+                                        <p:tgtEl>
+                                          <p:spTgt spid="43"/>
+                                        </p:tgtEl>
+                                      </p:cBhvr>
+                                    </p:animEffect>
+                                  </p:childTnLst>
+                                </p:cTn>
+                              </p:par>
+                              <p:par>
+                                <p:cTn id="182" presetID="10" presetClass="entr" presetSubtype="0" fill="hold" nodeType="withEffect">
+                                  <p:stCondLst>
+                                    <p:cond delay="0"/>
+                                  </p:stCondLst>
+                                  <p:childTnLst>
+                                    <p:set>
+                                      <p:cBhvr>
                                         <p:cTn id="183" dur="1" fill="hold">
                                           <p:stCondLst>
                                             <p:cond delay="0"/>
                                           </p:stCondLst>
                                         </p:cTn>
                                         <p:tgtEl>
-                                          <p:spTgt spid="43"/>
+                                          <p:spTgt spid="54"/>
                                         </p:tgtEl>
                                         <p:attrNameLst>
                                           <p:attrName>style.visibility</p:attrName>
@@ -8946,7 +8795,7 @@
                                       <p:cBhvr>
                                         <p:cTn id="184" dur="500"/>
                                         <p:tgtEl>
-                                          <p:spTgt spid="43"/>
+                                          <p:spTgt spid="54"/>
                                         </p:tgtEl>
                                       </p:cBhvr>
                                     </p:animEffect>
@@ -8967,7 +8816,7 @@
                                           </p:stCondLst>
                                         </p:cTn>
                                         <p:tgtEl>
-                                          <p:spTgt spid="54"/>
+                                          <p:spTgt spid="83"/>
                                         </p:tgtEl>
                                         <p:attrNameLst>
                                           <p:attrName>style.visibility</p:attrName>
@@ -8981,7 +8830,7 @@
                                       <p:cBhvr>
                                         <p:cTn id="187" dur="500"/>
                                         <p:tgtEl>
-                                          <p:spTgt spid="54"/>
+                                          <p:spTgt spid="83"/>
                                         </p:tgtEl>
                                       </p:cBhvr>
                                     </p:animEffect>
@@ -8989,7 +8838,7 @@
                                 </p:cTn>
                               </p:par>
                               <p:par>
-                                <p:cTn id="188" presetID="10" presetClass="entr" presetSubtype="0" fill="hold" nodeType="withEffect">
+                                <p:cTn id="188" presetID="10" presetClass="entr" presetSubtype="0" fill="hold" grpId="0" nodeType="withEffect">
                                   <p:stCondLst>
                                     <p:cond delay="0"/>
                                   </p:stCondLst>
@@ -9002,7 +8851,7 @@
                                           </p:stCondLst>
                                         </p:cTn>
                                         <p:tgtEl>
-                                          <p:spTgt spid="83"/>
+                                          <p:spTgt spid="84"/>
                                         </p:tgtEl>
                                         <p:attrNameLst>
                                           <p:attrName>style.visibility</p:attrName>
@@ -9016,7 +8865,7 @@
                                       <p:cBhvr>
                                         <p:cTn id="190" dur="500"/>
                                         <p:tgtEl>
-                                          <p:spTgt spid="83"/>
+                                          <p:spTgt spid="84"/>
                                         </p:tgtEl>
                                       </p:cBhvr>
                                     </p:animEffect>
@@ -9037,7 +8886,7 @@
                                           </p:stCondLst>
                                         </p:cTn>
                                         <p:tgtEl>
-                                          <p:spTgt spid="84"/>
+                                          <p:spTgt spid="92"/>
                                         </p:tgtEl>
                                         <p:attrNameLst>
                                           <p:attrName>style.visibility</p:attrName>
@@ -9051,7 +8900,7 @@
                                       <p:cBhvr>
                                         <p:cTn id="193" dur="500"/>
                                         <p:tgtEl>
-                                          <p:spTgt spid="84"/>
+                                          <p:spTgt spid="92"/>
                                         </p:tgtEl>
                                       </p:cBhvr>
                                     </p:animEffect>
@@ -9072,7 +8921,7 @@
                                           </p:stCondLst>
                                         </p:cTn>
                                         <p:tgtEl>
-                                          <p:spTgt spid="92"/>
+                                          <p:spTgt spid="95"/>
                                         </p:tgtEl>
                                         <p:attrNameLst>
                                           <p:attrName>style.visibility</p:attrName>
@@ -9085,41 +8934,6 @@
                                     <p:animEffect transition="in" filter="fade">
                                       <p:cBhvr>
                                         <p:cTn id="196" dur="500"/>
-                                        <p:tgtEl>
-                                          <p:spTgt spid="92"/>
-                                        </p:tgtEl>
-                                      </p:cBhvr>
-                                    </p:animEffect>
-                                  </p:childTnLst>
-                                </p:cTn>
-                              </p:par>
-                              <p:par>
-                                <p:cTn id="197" presetID="10" presetClass="entr" presetSubtype="0" fill="hold" grpId="0" nodeType="withEffect">
-                                  <p:stCondLst>
-                                    <p:cond delay="0"/>
-                                  </p:stCondLst>
-                                  <p:childTnLst>
-                                    <p:set>
-                                      <p:cBhvr>
-                                        <p:cTn id="198" dur="1" fill="hold">
-                                          <p:stCondLst>
-                                            <p:cond delay="0"/>
-                                          </p:stCondLst>
-                                        </p:cTn>
-                                        <p:tgtEl>
-                                          <p:spTgt spid="95"/>
-                                        </p:tgtEl>
-                                        <p:attrNameLst>
-                                          <p:attrName>style.visibility</p:attrName>
-                                        </p:attrNameLst>
-                                      </p:cBhvr>
-                                      <p:to>
-                                        <p:strVal val="visible"/>
-                                      </p:to>
-                                    </p:set>
-                                    <p:animEffect transition="in" filter="fade">
-                                      <p:cBhvr>
-                                        <p:cTn id="199" dur="500"/>
                                         <p:tgtEl>
                                           <p:spTgt spid="95"/>
                                         </p:tgtEl>
@@ -9135,32 +8949,67 @@
                     </p:cTn>
                   </p:par>
                   <p:par>
-                    <p:cTn id="200" fill="hold">
+                    <p:cTn id="197" fill="hold">
                       <p:stCondLst>
                         <p:cond delay="indefinite"/>
                       </p:stCondLst>
                       <p:childTnLst>
                         <p:par>
-                          <p:cTn id="201" fill="hold">
+                          <p:cTn id="198" fill="hold">
                             <p:stCondLst>
                               <p:cond delay="0"/>
                             </p:stCondLst>
                             <p:childTnLst>
                               <p:par>
-                                <p:cTn id="202" presetID="10" presetClass="entr" presetSubtype="0" fill="hold" grpId="0" nodeType="clickEffect">
+                                <p:cTn id="199" presetID="10" presetClass="entr" presetSubtype="0" fill="hold" grpId="0" nodeType="clickEffect">
                                   <p:stCondLst>
                                     <p:cond delay="0"/>
                                   </p:stCondLst>
                                   <p:childTnLst>
                                     <p:set>
                                       <p:cBhvr>
+                                        <p:cTn id="200" dur="1" fill="hold">
+                                          <p:stCondLst>
+                                            <p:cond delay="0"/>
+                                          </p:stCondLst>
+                                        </p:cTn>
+                                        <p:tgtEl>
+                                          <p:spTgt spid="97"/>
+                                        </p:tgtEl>
+                                        <p:attrNameLst>
+                                          <p:attrName>style.visibility</p:attrName>
+                                        </p:attrNameLst>
+                                      </p:cBhvr>
+                                      <p:to>
+                                        <p:strVal val="visible"/>
+                                      </p:to>
+                                    </p:set>
+                                    <p:animEffect transition="in" filter="fade">
+                                      <p:cBhvr>
+                                        <p:cTn id="201" dur="500"/>
+                                        <p:tgtEl>
+                                          <p:spTgt spid="97"/>
+                                        </p:tgtEl>
+                                      </p:cBhvr>
+                                    </p:animEffect>
+                                  </p:childTnLst>
+                                </p:cTn>
+                              </p:par>
+                              <p:par>
+                                <p:cTn id="202" presetID="10" presetClass="entr" presetSubtype="0" fill="hold" grpId="0" nodeType="withEffect">
+                                  <p:stCondLst>
+                                    <p:cond delay="0"/>
+                                  </p:stCondLst>
+                                  <p:childTnLst>
+                                    <p:set>
+                                      <p:cBhvr>
                                         <p:cTn id="203" dur="1" fill="hold">
                                           <p:stCondLst>
                                             <p:cond delay="0"/>
                                           </p:stCondLst>
                                         </p:cTn>
                                         <p:tgtEl>
-                                          <p:spTgt spid="97"/>
+                                          <p:spTgt spid="99"/>
                                         </p:tgtEl>
                                         <p:attrNameLst>
                                           <p:attrName>style.visibility</p:attrName>
@@ -9174,7 +9023,7 @@
                                       <p:cBhvr>
                                         <p:cTn id="204" dur="500"/>
                                         <p:tgtEl>
-                                          <p:spTgt spid="97"/>
+                                          <p:spTgt spid="99"/>
                                         </p:tgtEl>
                                       </p:cBhvr>
                                     </p:animEffect>
@@ -9182,7 +9031,7 @@
                                 </p:cTn>
                               </p:par>
                               <p:par>
-                                <p:cTn id="205" presetID="10" presetClass="entr" presetSubtype="0" fill="hold" grpId="0" nodeType="withEffect">
+                                <p:cTn id="205" presetID="10" presetClass="entr" presetSubtype="0" fill="hold" nodeType="withEffect">
                                   <p:stCondLst>
                                     <p:cond delay="0"/>
                                   </p:stCondLst>
@@ -9195,7 +9044,7 @@
                                           </p:stCondLst>
                                         </p:cTn>
                                         <p:tgtEl>
-                                          <p:spTgt spid="99"/>
+                                          <p:spTgt spid="126"/>
                                         </p:tgtEl>
                                         <p:attrNameLst>
                                           <p:attrName>style.visibility</p:attrName>
@@ -9209,7 +9058,7 @@
                                       <p:cBhvr>
                                         <p:cTn id="207" dur="500"/>
                                         <p:tgtEl>
-                                          <p:spTgt spid="99"/>
+                                          <p:spTgt spid="126"/>
                                         </p:tgtEl>
                                       </p:cBhvr>
                                     </p:animEffect>
@@ -9217,7 +9066,7 @@
                                 </p:cTn>
                               </p:par>
                               <p:par>
-                                <p:cTn id="208" presetID="10" presetClass="entr" presetSubtype="0" fill="hold" nodeType="withEffect">
+                                <p:cTn id="208" presetID="10" presetClass="entr" presetSubtype="0" fill="hold" grpId="0" nodeType="withEffect">
                                   <p:stCondLst>
                                     <p:cond delay="0"/>
                                   </p:stCondLst>
@@ -9230,7 +9079,7 @@
                                           </p:stCondLst>
                                         </p:cTn>
                                         <p:tgtEl>
-                                          <p:spTgt spid="126"/>
+                                          <p:spTgt spid="131"/>
                                         </p:tgtEl>
                                         <p:attrNameLst>
                                           <p:attrName>style.visibility</p:attrName>
@@ -9244,7 +9093,7 @@
                                       <p:cBhvr>
                                         <p:cTn id="210" dur="500"/>
                                         <p:tgtEl>
-                                          <p:spTgt spid="126"/>
+                                          <p:spTgt spid="131"/>
                                         </p:tgtEl>
                                       </p:cBhvr>
                                     </p:animEffect>
@@ -9265,7 +9114,7 @@
                                           </p:stCondLst>
                                         </p:cTn>
                                         <p:tgtEl>
-                                          <p:spTgt spid="131"/>
+                                          <p:spTgt spid="85"/>
                                         </p:tgtEl>
                                         <p:attrNameLst>
                                           <p:attrName>style.visibility</p:attrName>
@@ -9279,7 +9128,7 @@
                                       <p:cBhvr>
                                         <p:cTn id="213" dur="500"/>
                                         <p:tgtEl>
-                                          <p:spTgt spid="131"/>
+                                          <p:spTgt spid="85"/>
                                         </p:tgtEl>
                                       </p:cBhvr>
                                     </p:animEffect>
@@ -9287,7 +9136,7 @@
                                 </p:cTn>
                               </p:par>
                               <p:par>
-                                <p:cTn id="214" presetID="10" presetClass="entr" presetSubtype="0" fill="hold" grpId="0" nodeType="withEffect">
+                                <p:cTn id="214" presetID="10" presetClass="entr" presetSubtype="0" fill="hold" nodeType="withEffect">
                                   <p:stCondLst>
                                     <p:cond delay="0"/>
                                   </p:stCondLst>
@@ -9300,7 +9149,7 @@
                                           </p:stCondLst>
                                         </p:cTn>
                                         <p:tgtEl>
-                                          <p:spTgt spid="85"/>
+                                          <p:spTgt spid="90"/>
                                         </p:tgtEl>
                                         <p:attrNameLst>
                                           <p:attrName>style.visibility</p:attrName>
@@ -9314,235 +9163,7 @@
                                       <p:cBhvr>
                                         <p:cTn id="216" dur="500"/>
                                         <p:tgtEl>
-                                          <p:spTgt spid="85"/>
-                                        </p:tgtEl>
-                                      </p:cBhvr>
-                                    </p:animEffect>
-                                  </p:childTnLst>
-                                </p:cTn>
-                              </p:par>
-                            </p:childTnLst>
-                          </p:cTn>
-                        </p:par>
-                      </p:childTnLst>
-                    </p:cTn>
-                  </p:par>
-                  <p:par>
-                    <p:cTn id="217" fill="hold">
-                      <p:stCondLst>
-                        <p:cond delay="indefinite"/>
-                      </p:stCondLst>
-                      <p:childTnLst>
-                        <p:par>
-                          <p:cTn id="218" fill="hold">
-                            <p:stCondLst>
-                              <p:cond delay="0"/>
-                            </p:stCondLst>
-                            <p:childTnLst>
-                              <p:par>
-                                <p:cTn id="219" presetID="10" presetClass="entr" presetSubtype="0" fill="hold" grpId="0" nodeType="clickEffect">
-                                  <p:stCondLst>
-                                    <p:cond delay="0"/>
-                                  </p:stCondLst>
-                                  <p:childTnLst>
-                                    <p:set>
-                                      <p:cBhvr>
-                                        <p:cTn id="220" dur="1" fill="hold">
-                                          <p:stCondLst>
-                                            <p:cond delay="0"/>
-                                          </p:stCondLst>
-                                        </p:cTn>
-                                        <p:tgtEl>
-                                          <p:spTgt spid="88"/>
-                                        </p:tgtEl>
-                                        <p:attrNameLst>
-                                          <p:attrName>style.visibility</p:attrName>
-                                        </p:attrNameLst>
-                                      </p:cBhvr>
-                                      <p:to>
-                                        <p:strVal val="visible"/>
-                                      </p:to>
-                                    </p:set>
-                                    <p:animEffect transition="in" filter="fade">
-                                      <p:cBhvr>
-                                        <p:cTn id="221" dur="500"/>
-                                        <p:tgtEl>
-                                          <p:spTgt spid="88"/>
-                                        </p:tgtEl>
-                                      </p:cBhvr>
-                                    </p:animEffect>
-                                  </p:childTnLst>
-                                </p:cTn>
-                              </p:par>
-                              <p:par>
-                                <p:cTn id="222" presetID="10" presetClass="entr" presetSubtype="0" fill="hold" grpId="0" nodeType="withEffect">
-                                  <p:stCondLst>
-                                    <p:cond delay="0"/>
-                                  </p:stCondLst>
-                                  <p:childTnLst>
-                                    <p:set>
-                                      <p:cBhvr>
-                                        <p:cTn id="223" dur="1" fill="hold">
-                                          <p:stCondLst>
-                                            <p:cond delay="0"/>
-                                          </p:stCondLst>
-                                        </p:cTn>
-                                        <p:tgtEl>
-                                          <p:spTgt spid="89"/>
-                                        </p:tgtEl>
-                                        <p:attrNameLst>
-                                          <p:attrName>style.visibility</p:attrName>
-                                        </p:attrNameLst>
-                                      </p:cBhvr>
-                                      <p:to>
-                                        <p:strVal val="visible"/>
-                                      </p:to>
-                                    </p:set>
-                                    <p:animEffect transition="in" filter="fade">
-                                      <p:cBhvr>
-                                        <p:cTn id="224" dur="500"/>
-                                        <p:tgtEl>
-                                          <p:spTgt spid="89"/>
-                                        </p:tgtEl>
-                                      </p:cBhvr>
-                                    </p:animEffect>
-                                  </p:childTnLst>
-                                </p:cTn>
-                              </p:par>
-                              <p:par>
-                                <p:cTn id="225" presetID="10" presetClass="entr" presetSubtype="0" fill="hold" nodeType="withEffect">
-                                  <p:stCondLst>
-                                    <p:cond delay="0"/>
-                                  </p:stCondLst>
-                                  <p:childTnLst>
-                                    <p:set>
-                                      <p:cBhvr>
-                                        <p:cTn id="226" dur="1" fill="hold">
-                                          <p:stCondLst>
-                                            <p:cond delay="0"/>
-                                          </p:stCondLst>
-                                        </p:cTn>
-                                        <p:tgtEl>
                                           <p:spTgt spid="90"/>
-                                        </p:tgtEl>
-                                        <p:attrNameLst>
-                                          <p:attrName>style.visibility</p:attrName>
-                                        </p:attrNameLst>
-                                      </p:cBhvr>
-                                      <p:to>
-                                        <p:strVal val="visible"/>
-                                      </p:to>
-                                    </p:set>
-                                    <p:animEffect transition="in" filter="fade">
-                                      <p:cBhvr>
-                                        <p:cTn id="227" dur="500"/>
-                                        <p:tgtEl>
-                                          <p:spTgt spid="90"/>
-                                        </p:tgtEl>
-                                      </p:cBhvr>
-                                    </p:animEffect>
-                                  </p:childTnLst>
-                                </p:cTn>
-                              </p:par>
-                              <p:par>
-                                <p:cTn id="228" presetID="10" presetClass="entr" presetSubtype="0" fill="hold" grpId="0" nodeType="withEffect">
-                                  <p:stCondLst>
-                                    <p:cond delay="0"/>
-                                  </p:stCondLst>
-                                  <p:childTnLst>
-                                    <p:set>
-                                      <p:cBhvr>
-                                        <p:cTn id="229" dur="1" fill="hold">
-                                          <p:stCondLst>
-                                            <p:cond delay="0"/>
-                                          </p:stCondLst>
-                                        </p:cTn>
-                                        <p:tgtEl>
-                                          <p:spTgt spid="91"/>
-                                        </p:tgtEl>
-                                        <p:attrNameLst>
-                                          <p:attrName>style.visibility</p:attrName>
-                                        </p:attrNameLst>
-                                      </p:cBhvr>
-                                      <p:to>
-                                        <p:strVal val="visible"/>
-                                      </p:to>
-                                    </p:set>
-                                    <p:animEffect transition="in" filter="fade">
-                                      <p:cBhvr>
-                                        <p:cTn id="230" dur="500"/>
-                                        <p:tgtEl>
-                                          <p:spTgt spid="91"/>
-                                        </p:tgtEl>
-                                      </p:cBhvr>
-                                    </p:animEffect>
-                                  </p:childTnLst>
-                                </p:cTn>
-                              </p:par>
-                              <p:par>
-                                <p:cTn id="231" presetID="10" presetClass="entr" presetSubtype="0" fill="hold" nodeType="withEffect">
-                                  <p:stCondLst>
-                                    <p:cond delay="0"/>
-                                  </p:stCondLst>
-                                  <p:childTnLst>
-                                    <p:set>
-                                      <p:cBhvr>
-                                        <p:cTn id="232" dur="1" fill="hold">
-                                          <p:stCondLst>
-                                            <p:cond delay="0"/>
-                                          </p:stCondLst>
-                                        </p:cTn>
-                                        <p:tgtEl>
-                                          <p:spTgt spid="93"/>
-                                        </p:tgtEl>
-                                        <p:attrNameLst>
-                                          <p:attrName>style.visibility</p:attrName>
-                                        </p:attrNameLst>
-                                      </p:cBhvr>
-                                      <p:to>
-                                        <p:strVal val="visible"/>
-                                      </p:to>
-                                    </p:set>
-                                    <p:animEffect transition="in" filter="fade">
-                                      <p:cBhvr>
-                                        <p:cTn id="233" dur="500"/>
-                                        <p:tgtEl>
-                                          <p:spTgt spid="93"/>
-                                        </p:tgtEl>
-                                      </p:cBhvr>
-                                    </p:animEffect>
-                                  </p:childTnLst>
-                                </p:cTn>
-                              </p:par>
-                              <p:par>
-                                <p:cTn id="234" presetID="10" presetClass="entr" presetSubtype="0" fill="hold" grpId="0" nodeType="withEffect">
-                                  <p:stCondLst>
-                                    <p:cond delay="0"/>
-                                  </p:stCondLst>
-                                  <p:childTnLst>
-                                    <p:set>
-                                      <p:cBhvr>
-                                        <p:cTn id="235" dur="1" fill="hold">
-                                          <p:stCondLst>
-                                            <p:cond delay="0"/>
-                                          </p:stCondLst>
-                                        </p:cTn>
-                                        <p:tgtEl>
-                                          <p:spTgt spid="94"/>
-                                        </p:tgtEl>
-                                        <p:attrNameLst>
-                                          <p:attrName>style.visibility</p:attrName>
-                                        </p:attrNameLst>
-                                      </p:cBhvr>
-                                      <p:to>
-                                        <p:strVal val="visible"/>
-                                      </p:to>
-                                    </p:set>
-                                    <p:animEffect transition="in" filter="fade">
-                                      <p:cBhvr>
-                                        <p:cTn id="236" dur="500"/>
-                                        <p:tgtEl>
-                                          <p:spTgt spid="94"/>
                                         </p:tgtEl>
                                       </p:cBhvr>
                                     </p:animEffect>
@@ -9608,7 +9229,6 @@
       <p:bldP spid="59" grpId="0"/>
       <p:bldP spid="61" grpId="0"/>
       <p:bldP spid="63" grpId="0"/>
-      <p:bldP spid="64" grpId="0"/>
       <p:bldP spid="67" grpId="0"/>
       <p:bldP spid="68" grpId="0"/>
       <p:bldP spid="69" grpId="0" animBg="1"/>
@@ -9622,10 +9242,6 @@
       <p:bldP spid="99" grpId="0"/>
       <p:bldP spid="131" grpId="0"/>
       <p:bldP spid="85" grpId="0" animBg="1"/>
-      <p:bldP spid="88" grpId="0" animBg="1"/>
-      <p:bldP spid="89" grpId="0"/>
-      <p:bldP spid="91" grpId="0"/>
-      <p:bldP spid="94" grpId="0"/>
     </p:bldLst>
   </p:timing>
 </p:sld>

</xml_diff>